<commit_message>
Signed-off-by: Aidan Casey <aidancasey@gmail.com>
</commit_message>
<xml_diff>
--- a/presentation/Building Node.js Applications on Windows Azure.pptx
+++ b/presentation/Building Node.js Applications on Windows Azure.pptx
@@ -12994,7 +12994,11 @@
           <a:p>
             <a:r>
               <a:rPr lang="en-AU" dirty="0" smtClean="0"/>
-              <a:t>Hello World!	</a:t>
+              <a:t>When should I use it?</a:t>
+            </a:r>
+            <a:r>
+              <a:rPr lang="en-AU" dirty="0" smtClean="0"/>
+              <a:t>	</a:t>
             </a:r>
             <a:endParaRPr lang="en-AU" dirty="0"/>
           </a:p>
@@ -13017,7 +13021,39 @@
           <a:p>
             <a:r>
               <a:rPr lang="en-AU" dirty="0" smtClean="0"/>
-              <a:t>Build a http webserver in 5 lines of code !!!</a:t>
+              <a:t>Chat/Messaging Apps</a:t>
+            </a:r>
+          </a:p>
+          <a:p>
+            <a:r>
+              <a:rPr lang="en-AU" dirty="0" smtClean="0"/>
+              <a:t>Real time Apps ( stocks / ticker tape)</a:t>
+            </a:r>
+          </a:p>
+          <a:p>
+            <a:r>
+              <a:rPr lang="en-AU" dirty="0" smtClean="0"/>
+              <a:t>Highly Concurrent apps</a:t>
+            </a:r>
+          </a:p>
+          <a:p>
+            <a:r>
+              <a:rPr lang="en-AU" dirty="0" smtClean="0"/>
+              <a:t>Single page apps with lots of asynchronous calls (Gmail </a:t>
+            </a:r>
+            <a:r>
+              <a:rPr lang="en-AU" dirty="0" err="1" smtClean="0"/>
+              <a:t>etc</a:t>
+            </a:r>
+            <a:r>
+              <a:rPr lang="en-AU" dirty="0" smtClean="0"/>
+              <a:t>)</a:t>
+            </a:r>
+          </a:p>
+          <a:p>
+            <a:r>
+              <a:rPr lang="en-AU" dirty="0" smtClean="0"/>
+              <a:t>Serving lots of dynamic content</a:t>
             </a:r>
             <a:endParaRPr lang="en-AU" dirty="0"/>
           </a:p>
@@ -14348,11 +14384,7 @@
             </a:r>
             <a:r>
               <a:rPr lang="en-AU" sz="1000" dirty="0" smtClean="0"/>
-              <a:t> releases API built on </a:t>
-            </a:r>
-            <a:r>
-              <a:rPr lang="en-AU" sz="1000" dirty="0" smtClean="0"/>
-              <a:t>node</a:t>
+              <a:t> releases API built on node</a:t>
             </a:r>
           </a:p>
           <a:p>
@@ -14373,7 +14405,6 @@
               <a:rPr lang="en-AU" sz="1000" dirty="0" smtClean="0"/>
               <a:t>support</a:t>
             </a:r>
-            <a:endParaRPr lang="en-AU" sz="1000" dirty="0" smtClean="0"/>
           </a:p>
           <a:p>
             <a:endParaRPr lang="en-AU" sz="1000" dirty="0"/>
@@ -14849,11 +14880,7 @@
           <a:p>
             <a:r>
               <a:rPr lang="en-AU" sz="1000" b="1" dirty="0" smtClean="0"/>
-              <a:t>Nov </a:t>
-            </a:r>
-            <a:r>
-              <a:rPr lang="en-AU" sz="1000" b="1" dirty="0" smtClean="0"/>
-              <a:t>2010  Cloud9IDE</a:t>
+              <a:t>Nov 2010  Cloud9IDE</a:t>
             </a:r>
           </a:p>
           <a:p>
@@ -19103,21 +19130,6 @@
 </file>
 
 <file path=customXml/item1.xml><?xml version="1.0" encoding="utf-8"?>
-<p:properties xmlns:p="http://schemas.microsoft.com/office/2006/metadata/properties" xmlns:xsi="http://www.w3.org/2001/XMLSchema-instance">
-  <documentManagement/>
-</p:properties>
-</file>
-
-<file path=customXml/item2.xml><?xml version="1.0" encoding="utf-8"?>
-<?mso-contentType ?>
-<FormTemplates xmlns="http://schemas.microsoft.com/sharepoint/v3/contenttype/forms">
-  <Display>DocumentLibraryForm</Display>
-  <Edit>DocumentLibraryForm</Edit>
-  <New>DocumentLibraryForm</New>
-</FormTemplates>
-</file>
-
-<file path=customXml/item3.xml><?xml version="1.0" encoding="utf-8"?>
 <?mso-contentType ?>
 <rca:RCAuthoringProperties xmlns:rca="urn:sharePointPublishingRcaProperties">
   <rca:Converter rca:guid="6dfdc5b4-2a28-4a06-b0c6-ad3901e3a807">
@@ -19133,6 +19145,21 @@
     <rca:property rca:type="ConverterSpecificSettings"/>
   </rca:Converter>
 </rca:RCAuthoringProperties>
+</file>
+
+<file path=customXml/item2.xml><?xml version="1.0" encoding="utf-8"?>
+<?mso-contentType ?>
+<FormTemplates xmlns="http://schemas.microsoft.com/sharepoint/v3/contenttype/forms">
+  <Display>DocumentLibraryForm</Display>
+  <Edit>DocumentLibraryForm</Edit>
+  <New>DocumentLibraryForm</New>
+</FormTemplates>
+</file>
+
+<file path=customXml/item3.xml><?xml version="1.0" encoding="utf-8"?>
+<p:properties xmlns:p="http://schemas.microsoft.com/office/2006/metadata/properties" xmlns:xsi="http://www.w3.org/2001/XMLSchema-instance">
+  <documentManagement/>
+</p:properties>
 </file>
 
 <file path=customXml/item4.xml><?xml version="1.0" encoding="utf-8"?>
@@ -19185,15 +19212,9 @@
 </file>
 
 <file path=customXml/itemProps1.xml><?xml version="1.0" encoding="utf-8"?>
-<ds:datastoreItem xmlns:ds="http://schemas.openxmlformats.org/officeDocument/2006/customXml" ds:itemID="{BDEC00FF-5F1B-415D-9C89-173832172D95}">
+<ds:datastoreItem xmlns:ds="http://schemas.openxmlformats.org/officeDocument/2006/customXml" ds:itemID="{37DE6E84-255A-45E8-8353-BCD6A4998E02}">
   <ds:schemaRefs>
-    <ds:schemaRef ds:uri="http://schemas.microsoft.com/office/2006/metadata/properties"/>
-    <ds:schemaRef ds:uri="http://schemas.openxmlformats.org/package/2006/metadata/core-properties"/>
-    <ds:schemaRef ds:uri="http://schemas.microsoft.com/office/2006/documentManagement/types"/>
-    <ds:schemaRef ds:uri="http://purl.org/dc/elements/1.1/"/>
-    <ds:schemaRef ds:uri="http://purl.org/dc/dcmitype/"/>
-    <ds:schemaRef ds:uri="http://purl.org/dc/terms/"/>
-    <ds:schemaRef ds:uri="http://www.w3.org/XML/1998/namespace"/>
+    <ds:schemaRef ds:uri="urn:sharePointPublishingRcaProperties"/>
   </ds:schemaRefs>
 </ds:datastoreItem>
 </file>
@@ -19207,9 +19228,15 @@
 </file>
 
 <file path=customXml/itemProps3.xml><?xml version="1.0" encoding="utf-8"?>
-<ds:datastoreItem xmlns:ds="http://schemas.openxmlformats.org/officeDocument/2006/customXml" ds:itemID="{37DE6E84-255A-45E8-8353-BCD6A4998E02}">
+<ds:datastoreItem xmlns:ds="http://schemas.openxmlformats.org/officeDocument/2006/customXml" ds:itemID="{BDEC00FF-5F1B-415D-9C89-173832172D95}">
   <ds:schemaRefs>
-    <ds:schemaRef ds:uri="urn:sharePointPublishingRcaProperties"/>
+    <ds:schemaRef ds:uri="http://schemas.microsoft.com/office/2006/metadata/properties"/>
+    <ds:schemaRef ds:uri="http://schemas.openxmlformats.org/package/2006/metadata/core-properties"/>
+    <ds:schemaRef ds:uri="http://schemas.microsoft.com/office/2006/documentManagement/types"/>
+    <ds:schemaRef ds:uri="http://purl.org/dc/elements/1.1/"/>
+    <ds:schemaRef ds:uri="http://purl.org/dc/dcmitype/"/>
+    <ds:schemaRef ds:uri="http://purl.org/dc/terms/"/>
+    <ds:schemaRef ds:uri="http://www.w3.org/XML/1998/namespace"/>
   </ds:schemaRefs>
 </ds:datastoreItem>
 </file>

</xml_diff>